<commit_message>
Updated deck for final presentation
</commit_message>
<xml_diff>
--- a/Documents/2014Spring/Final Presentation ClubUML Spring 2014.pptx
+++ b/Documents/2014Spring/Final Presentation ClubUML Spring 2014.pptx
@@ -4524,11 +4524,7 @@
           <a:p>
             <a:r>
               <a:rPr lang="en-US" dirty="0" smtClean="0"/>
-              <a:t>Validation </a:t>
-            </a:r>
-            <a:r>
-              <a:rPr lang="en-US" dirty="0" smtClean="0"/>
-              <a:t>Overview</a:t>
+              <a:t>Validation Overview</a:t>
             </a:r>
             <a:endParaRPr lang="en-US" dirty="0"/>
           </a:p>
@@ -5649,7 +5645,7 @@
     </p:spTree>
     <p:extLst>
       <p:ext uri="{BB962C8B-B14F-4D97-AF65-F5344CB8AC3E}">
-        <p14:creationId xmlns:p14="http://schemas.microsoft.com/office/powerpoint/2010/main" val="1153343402"/>
+        <p14:creationId xmlns:p14="http://schemas.microsoft.com/office/powerpoint/2010/main" val="2656205815"/>
       </p:ext>
     </p:extLst>
   </p:cSld>
@@ -6074,7 +6070,7 @@
     </p:spTree>
     <p:extLst>
       <p:ext uri="{BB962C8B-B14F-4D97-AF65-F5344CB8AC3E}">
-        <p14:creationId xmlns:p14="http://schemas.microsoft.com/office/powerpoint/2010/main" val="699105575"/>
+        <p14:creationId xmlns:p14="http://schemas.microsoft.com/office/powerpoint/2010/main" val="3477368304"/>
       </p:ext>
     </p:extLst>
   </p:cSld>
@@ -6347,7 +6343,7 @@
     </p:spTree>
     <p:extLst>
       <p:ext uri="{BB962C8B-B14F-4D97-AF65-F5344CB8AC3E}">
-        <p14:creationId xmlns:p14="http://schemas.microsoft.com/office/powerpoint/2010/main" val="1825469448"/>
+        <p14:creationId xmlns:p14="http://schemas.microsoft.com/office/powerpoint/2010/main" val="3948807160"/>
       </p:ext>
     </p:extLst>
   </p:cSld>
@@ -6656,7 +6652,7 @@
     </p:spTree>
     <p:extLst>
       <p:ext uri="{BB962C8B-B14F-4D97-AF65-F5344CB8AC3E}">
-        <p14:creationId xmlns:p14="http://schemas.microsoft.com/office/powerpoint/2010/main" val="828924118"/>
+        <p14:creationId xmlns:p14="http://schemas.microsoft.com/office/powerpoint/2010/main" val="1496415592"/>
       </p:ext>
     </p:extLst>
   </p:cSld>
@@ -6909,7 +6905,7 @@
     </p:spTree>
     <p:extLst>
       <p:ext uri="{BB962C8B-B14F-4D97-AF65-F5344CB8AC3E}">
-        <p14:creationId xmlns:p14="http://schemas.microsoft.com/office/powerpoint/2010/main" val="3741049718"/>
+        <p14:creationId xmlns:p14="http://schemas.microsoft.com/office/powerpoint/2010/main" val="1593253214"/>
       </p:ext>
     </p:extLst>
   </p:cSld>
@@ -7231,7 +7227,7 @@
     </p:spTree>
     <p:extLst>
       <p:ext uri="{BB962C8B-B14F-4D97-AF65-F5344CB8AC3E}">
-        <p14:creationId xmlns:p14="http://schemas.microsoft.com/office/powerpoint/2010/main" val="2126335346"/>
+        <p14:creationId xmlns:p14="http://schemas.microsoft.com/office/powerpoint/2010/main" val="1306872183"/>
       </p:ext>
     </p:extLst>
   </p:cSld>
@@ -7409,12 +7405,8 @@
               <a:buSzPct val="75000"/>
             </a:pPr>
             <a:r>
-              <a:rPr lang="en-US" sz="1800" b="1" dirty="0"/>
-              <a:t>Have team meeting every week and keep every team member on the same page</a:t>
-            </a:r>
-            <a:r>
               <a:rPr lang="en-US" sz="1800" b="1" dirty="0" smtClean="0"/>
-              <a:t>.</a:t>
+              <a:t>Use JSON to facilitate the data exchange and interaction between back-end and front-end.</a:t>
             </a:r>
           </a:p>
           <a:p>
@@ -7434,13 +7426,72 @@
               <a:buSzPct val="75000"/>
             </a:pPr>
             <a:r>
-              <a:rPr lang="en-US" sz="1800" b="1" dirty="0" smtClean="0"/>
-              <a:t>Use JSON to facilitate the data exchange and interaction between back-end </a:t>
-            </a:r>
-            <a:r>
-              <a:rPr lang="en-US" sz="1800" b="1" smtClean="0"/>
-              <a:t>and front-end.</a:t>
-            </a:r>
+              <a:rPr lang="en-US" altLang="zh-CN" sz="1800" b="1" dirty="0"/>
+              <a:t>Deliverables is a very important part of communication. Manager can get explicit data and progress of your job from the deliverables</a:t>
+            </a:r>
+            <a:r>
+              <a:rPr lang="en-US" altLang="zh-CN" sz="1800" b="1" dirty="0" smtClean="0"/>
+              <a:t>.</a:t>
+            </a:r>
+          </a:p>
+          <a:p>
+            <a:pPr marL="568325" lvl="1" indent="-227013" fontAlgn="base">
+              <a:lnSpc>
+                <a:spcPts val="1800"/>
+              </a:lnSpc>
+              <a:spcBef>
+                <a:spcPct val="0"/>
+              </a:spcBef>
+              <a:spcAft>
+                <a:spcPts val="800"/>
+              </a:spcAft>
+              <a:buClr>
+                <a:srgbClr val="FDAA03"/>
+              </a:buClr>
+              <a:buSzPct val="75000"/>
+            </a:pPr>
+            <a:r>
+              <a:rPr lang="en-US" altLang="zh-CN" sz="1800" b="1" dirty="0"/>
+              <a:t>Have team meeting every week and keep every team member on the same page.</a:t>
+            </a:r>
+          </a:p>
+          <a:p>
+            <a:pPr marL="568325" lvl="1" indent="-227013" fontAlgn="base">
+              <a:lnSpc>
+                <a:spcPts val="1800"/>
+              </a:lnSpc>
+              <a:spcBef>
+                <a:spcPct val="0"/>
+              </a:spcBef>
+              <a:spcAft>
+                <a:spcPts val="800"/>
+              </a:spcAft>
+              <a:buClr>
+                <a:srgbClr val="FDAA03"/>
+              </a:buClr>
+              <a:buSzPct val="75000"/>
+            </a:pPr>
+            <a:r>
+              <a:rPr lang="en-US" altLang="zh-CN" sz="1800" b="1" dirty="0"/>
+              <a:t>Have more communicate with other team, especially when two teams work on the same function. </a:t>
+            </a:r>
+          </a:p>
+          <a:p>
+            <a:pPr marL="568325" lvl="1" indent="-227013" fontAlgn="base">
+              <a:lnSpc>
+                <a:spcPts val="1800"/>
+              </a:lnSpc>
+              <a:spcBef>
+                <a:spcPct val="0"/>
+              </a:spcBef>
+              <a:spcAft>
+                <a:spcPts val="800"/>
+              </a:spcAft>
+              <a:buClr>
+                <a:srgbClr val="FDAA03"/>
+              </a:buClr>
+              <a:buSzPct val="75000"/>
+            </a:pPr>
             <a:endParaRPr lang="en-US" sz="1800" b="1" dirty="0"/>
           </a:p>
         </p:txBody>
@@ -7448,7 +7499,7 @@
     </p:spTree>
     <p:extLst>
       <p:ext uri="{BB962C8B-B14F-4D97-AF65-F5344CB8AC3E}">
-        <p14:creationId xmlns:p14="http://schemas.microsoft.com/office/powerpoint/2010/main" val="1592376931"/>
+        <p14:creationId xmlns:p14="http://schemas.microsoft.com/office/powerpoint/2010/main" val="2093055557"/>
       </p:ext>
     </p:extLst>
   </p:cSld>

</xml_diff>